<commit_message>
Added explanations in uc theory section
</commit_message>
<xml_diff>
--- a/docs/paper/graphics/suc-experiment.pptx
+++ b/docs/paper/graphics/suc-experiment.pptx
@@ -197,7 +197,7 @@
           <a:p>
             <a:fld id="{2EEA6F30-0CB3-4940-BF8E-C464E60C54BE}" type="datetimeFigureOut">
               <a:rPr lang="en-US" smtClean="0"/>
-              <a:t>10/18/18</a:t>
+              <a:t>11/5/18</a:t>
             </a:fld>
             <a:endParaRPr lang="en-US"/>
           </a:p>
@@ -596,7 +596,7 @@
           <a:p>
             <a:fld id="{98A996D5-9536-4841-A147-9AD88C6446A0}" type="datetimeFigureOut">
               <a:rPr lang="en-US" smtClean="0"/>
-              <a:t>10/18/18</a:t>
+              <a:t>11/5/18</a:t>
             </a:fld>
             <a:endParaRPr lang="en-US"/>
           </a:p>
@@ -766,7 +766,7 @@
           <a:p>
             <a:fld id="{98A996D5-9536-4841-A147-9AD88C6446A0}" type="datetimeFigureOut">
               <a:rPr lang="en-US" smtClean="0"/>
-              <a:t>10/18/18</a:t>
+              <a:t>11/5/18</a:t>
             </a:fld>
             <a:endParaRPr lang="en-US"/>
           </a:p>
@@ -946,7 +946,7 @@
           <a:p>
             <a:fld id="{98A996D5-9536-4841-A147-9AD88C6446A0}" type="datetimeFigureOut">
               <a:rPr lang="en-US" smtClean="0"/>
-              <a:t>10/18/18</a:t>
+              <a:t>11/5/18</a:t>
             </a:fld>
             <a:endParaRPr lang="en-US"/>
           </a:p>
@@ -1116,7 +1116,7 @@
           <a:p>
             <a:fld id="{98A996D5-9536-4841-A147-9AD88C6446A0}" type="datetimeFigureOut">
               <a:rPr lang="en-US" smtClean="0"/>
-              <a:t>10/18/18</a:t>
+              <a:t>11/5/18</a:t>
             </a:fld>
             <a:endParaRPr lang="en-US"/>
           </a:p>
@@ -1362,7 +1362,7 @@
           <a:p>
             <a:fld id="{98A996D5-9536-4841-A147-9AD88C6446A0}" type="datetimeFigureOut">
               <a:rPr lang="en-US" smtClean="0"/>
-              <a:t>10/18/18</a:t>
+              <a:t>11/5/18</a:t>
             </a:fld>
             <a:endParaRPr lang="en-US"/>
           </a:p>
@@ -1594,7 +1594,7 @@
           <a:p>
             <a:fld id="{98A996D5-9536-4841-A147-9AD88C6446A0}" type="datetimeFigureOut">
               <a:rPr lang="en-US" smtClean="0"/>
-              <a:t>10/18/18</a:t>
+              <a:t>11/5/18</a:t>
             </a:fld>
             <a:endParaRPr lang="en-US"/>
           </a:p>
@@ -1961,7 +1961,7 @@
           <a:p>
             <a:fld id="{98A996D5-9536-4841-A147-9AD88C6446A0}" type="datetimeFigureOut">
               <a:rPr lang="en-US" smtClean="0"/>
-              <a:t>10/18/18</a:t>
+              <a:t>11/5/18</a:t>
             </a:fld>
             <a:endParaRPr lang="en-US"/>
           </a:p>
@@ -2079,7 +2079,7 @@
           <a:p>
             <a:fld id="{98A996D5-9536-4841-A147-9AD88C6446A0}" type="datetimeFigureOut">
               <a:rPr lang="en-US" smtClean="0"/>
-              <a:t>10/18/18</a:t>
+              <a:t>11/5/18</a:t>
             </a:fld>
             <a:endParaRPr lang="en-US"/>
           </a:p>
@@ -2174,7 +2174,7 @@
           <a:p>
             <a:fld id="{98A996D5-9536-4841-A147-9AD88C6446A0}" type="datetimeFigureOut">
               <a:rPr lang="en-US" smtClean="0"/>
-              <a:t>10/18/18</a:t>
+              <a:t>11/5/18</a:t>
             </a:fld>
             <a:endParaRPr lang="en-US"/>
           </a:p>
@@ -2451,7 +2451,7 @@
           <a:p>
             <a:fld id="{98A996D5-9536-4841-A147-9AD88C6446A0}" type="datetimeFigureOut">
               <a:rPr lang="en-US" smtClean="0"/>
-              <a:t>10/18/18</a:t>
+              <a:t>11/5/18</a:t>
             </a:fld>
             <a:endParaRPr lang="en-US"/>
           </a:p>
@@ -2704,7 +2704,7 @@
           <a:p>
             <a:fld id="{98A996D5-9536-4841-A147-9AD88C6446A0}" type="datetimeFigureOut">
               <a:rPr lang="en-US" smtClean="0"/>
-              <a:t>10/18/18</a:t>
+              <a:t>11/5/18</a:t>
             </a:fld>
             <a:endParaRPr lang="en-US"/>
           </a:p>
@@ -2917,7 +2917,7 @@
           <a:p>
             <a:fld id="{98A996D5-9536-4841-A147-9AD88C6446A0}" type="datetimeFigureOut">
               <a:rPr lang="en-US" smtClean="0"/>
-              <a:t>10/18/18</a:t>
+              <a:t>11/5/18</a:t>
             </a:fld>
             <a:endParaRPr lang="en-US"/>
           </a:p>
@@ -4575,7 +4575,7 @@
       </p:pic>
       <p:pic>
         <p:nvPicPr>
-          <p:cNvPr id="3" name="Picture 2"/>
+          <p:cNvPr id="5" name="Picture 4"/>
           <p:cNvPicPr>
             <a:picLocks noChangeAspect="1"/>
           </p:cNvPicPr>
@@ -4589,8 +4589,8 @@
         </p:blipFill>
         <p:spPr>
           <a:xfrm>
-            <a:off x="8087354" y="3143829"/>
-            <a:ext cx="228600" cy="228600"/>
+            <a:off x="5512613" y="3162879"/>
+            <a:ext cx="177800" cy="215900"/>
           </a:xfrm>
           <a:prstGeom prst="rect">
             <a:avLst/>
@@ -4599,7 +4599,7 @@
       </p:pic>
       <p:pic>
         <p:nvPicPr>
-          <p:cNvPr id="4" name="Picture 3"/>
+          <p:cNvPr id="6" name="Picture 5"/>
           <p:cNvPicPr>
             <a:picLocks noChangeAspect="1"/>
           </p:cNvPicPr>
@@ -4613,8 +4613,8 @@
         </p:blipFill>
         <p:spPr>
           <a:xfrm>
-            <a:off x="8843264" y="3150179"/>
-            <a:ext cx="177800" cy="215900"/>
+            <a:off x="8025366" y="3131129"/>
+            <a:ext cx="355600" cy="279400"/>
           </a:xfrm>
           <a:prstGeom prst="rect">
             <a:avLst/>
@@ -4623,22 +4623,22 @@
       </p:pic>
       <p:pic>
         <p:nvPicPr>
-          <p:cNvPr id="5" name="Picture 4"/>
+          <p:cNvPr id="7" name="Picture 6"/>
           <p:cNvPicPr>
             <a:picLocks noChangeAspect="1"/>
           </p:cNvPicPr>
           <p:nvPr/>
         </p:nvPicPr>
         <p:blipFill>
-          <a:blip r:embed="rId9"/>
+          <a:blip r:embed="rId10"/>
           <a:stretch>
             <a:fillRect/>
           </a:stretch>
         </p:blipFill>
         <p:spPr>
           <a:xfrm>
-            <a:off x="5512613" y="3162879"/>
-            <a:ext cx="177800" cy="215900"/>
+            <a:off x="8773414" y="3143829"/>
+            <a:ext cx="317500" cy="266700"/>
           </a:xfrm>
           <a:prstGeom prst="rect">
             <a:avLst/>

</xml_diff>